<commit_message>
Add ability to close login stage
</commit_message>
<xml_diff>
--- a/otherFiles/art.pptx
+++ b/otherFiles/art.pptx
@@ -105,6 +105,11 @@
       </a:defRPr>
     </a:lvl9pPr>
   </p:defaultTextStyle>
+  <p:extLst>
+    <p:ext uri="{EFAFB233-063F-42B5-8137-9DF3F51BA10A}">
+      <p15:sldGuideLst xmlns:p15="http://schemas.microsoft.com/office/powerpoint/2012/main"/>
+    </p:ext>
+  </p:extLst>
 </p:presentation>
 </file>
 
@@ -257,7 +262,7 @@
           <a:p>
             <a:fld id="{9F3C69D0-45EA-45C2-BB6E-F1067A47D396}" type="datetimeFigureOut">
               <a:rPr lang="en-SG" smtClean="0"/>
-              <a:t>26/5/2021</a:t>
+              <a:t>27/5/2021</a:t>
             </a:fld>
             <a:endParaRPr lang="en-SG"/>
           </a:p>
@@ -457,7 +462,7 @@
           <a:p>
             <a:fld id="{9F3C69D0-45EA-45C2-BB6E-F1067A47D396}" type="datetimeFigureOut">
               <a:rPr lang="en-SG" smtClean="0"/>
-              <a:t>26/5/2021</a:t>
+              <a:t>27/5/2021</a:t>
             </a:fld>
             <a:endParaRPr lang="en-SG"/>
           </a:p>
@@ -667,7 +672,7 @@
           <a:p>
             <a:fld id="{9F3C69D0-45EA-45C2-BB6E-F1067A47D396}" type="datetimeFigureOut">
               <a:rPr lang="en-SG" smtClean="0"/>
-              <a:t>26/5/2021</a:t>
+              <a:t>27/5/2021</a:t>
             </a:fld>
             <a:endParaRPr lang="en-SG"/>
           </a:p>
@@ -867,7 +872,7 @@
           <a:p>
             <a:fld id="{9F3C69D0-45EA-45C2-BB6E-F1067A47D396}" type="datetimeFigureOut">
               <a:rPr lang="en-SG" smtClean="0"/>
-              <a:t>26/5/2021</a:t>
+              <a:t>27/5/2021</a:t>
             </a:fld>
             <a:endParaRPr lang="en-SG"/>
           </a:p>
@@ -1143,7 +1148,7 @@
           <a:p>
             <a:fld id="{9F3C69D0-45EA-45C2-BB6E-F1067A47D396}" type="datetimeFigureOut">
               <a:rPr lang="en-SG" smtClean="0"/>
-              <a:t>26/5/2021</a:t>
+              <a:t>27/5/2021</a:t>
             </a:fld>
             <a:endParaRPr lang="en-SG"/>
           </a:p>
@@ -1411,7 +1416,7 @@
           <a:p>
             <a:fld id="{9F3C69D0-45EA-45C2-BB6E-F1067A47D396}" type="datetimeFigureOut">
               <a:rPr lang="en-SG" smtClean="0"/>
-              <a:t>26/5/2021</a:t>
+              <a:t>27/5/2021</a:t>
             </a:fld>
             <a:endParaRPr lang="en-SG"/>
           </a:p>
@@ -1826,7 +1831,7 @@
           <a:p>
             <a:fld id="{9F3C69D0-45EA-45C2-BB6E-F1067A47D396}" type="datetimeFigureOut">
               <a:rPr lang="en-SG" smtClean="0"/>
-              <a:t>26/5/2021</a:t>
+              <a:t>27/5/2021</a:t>
             </a:fld>
             <a:endParaRPr lang="en-SG"/>
           </a:p>
@@ -1968,7 +1973,7 @@
           <a:p>
             <a:fld id="{9F3C69D0-45EA-45C2-BB6E-F1067A47D396}" type="datetimeFigureOut">
               <a:rPr lang="en-SG" smtClean="0"/>
-              <a:t>26/5/2021</a:t>
+              <a:t>27/5/2021</a:t>
             </a:fld>
             <a:endParaRPr lang="en-SG"/>
           </a:p>
@@ -2081,7 +2086,7 @@
           <a:p>
             <a:fld id="{9F3C69D0-45EA-45C2-BB6E-F1067A47D396}" type="datetimeFigureOut">
               <a:rPr lang="en-SG" smtClean="0"/>
-              <a:t>26/5/2021</a:t>
+              <a:t>27/5/2021</a:t>
             </a:fld>
             <a:endParaRPr lang="en-SG"/>
           </a:p>
@@ -2394,7 +2399,7 @@
           <a:p>
             <a:fld id="{9F3C69D0-45EA-45C2-BB6E-F1067A47D396}" type="datetimeFigureOut">
               <a:rPr lang="en-SG" smtClean="0"/>
-              <a:t>26/5/2021</a:t>
+              <a:t>27/5/2021</a:t>
             </a:fld>
             <a:endParaRPr lang="en-SG"/>
           </a:p>
@@ -2683,7 +2688,7 @@
           <a:p>
             <a:fld id="{9F3C69D0-45EA-45C2-BB6E-F1067A47D396}" type="datetimeFigureOut">
               <a:rPr lang="en-SG" smtClean="0"/>
-              <a:t>26/5/2021</a:t>
+              <a:t>27/5/2021</a:t>
             </a:fld>
             <a:endParaRPr lang="en-SG"/>
           </a:p>
@@ -2926,7 +2931,7 @@
           <a:p>
             <a:fld id="{9F3C69D0-45EA-45C2-BB6E-F1067A47D396}" type="datetimeFigureOut">
               <a:rPr lang="en-SG" smtClean="0"/>
-              <a:t>26/5/2021</a:t>
+              <a:t>27/5/2021</a:t>
             </a:fld>
             <a:endParaRPr lang="en-SG"/>
           </a:p>
@@ -3392,7 +3397,10 @@
           <a:bodyPr/>
           <a:lstStyle/>
           <a:p>
-            <a:endParaRPr lang="en-SG"/>
+            <a:r>
+              <a:rPr lang="en-SG" dirty="0"/>
+              <a:t>By Amelia</a:t>
+            </a:r>
           </a:p>
         </p:txBody>
       </p:sp>
@@ -3426,6 +3434,156 @@
           <a:chExt cx="0" cy="0"/>
         </a:xfrm>
       </p:grpSpPr>
+      <p:sp>
+        <p:nvSpPr>
+          <p:cNvPr id="3" name="Oval 2">
+            <a:extLst>
+              <a:ext uri="{FF2B5EF4-FFF2-40B4-BE49-F238E27FC236}">
+                <a16:creationId xmlns:a16="http://schemas.microsoft.com/office/drawing/2014/main" id="{1D5FC683-21E3-466E-A964-BB73DA83A516}"/>
+              </a:ext>
+            </a:extLst>
+          </p:cNvPr>
+          <p:cNvSpPr/>
+          <p:nvPr/>
+        </p:nvSpPr>
+        <p:spPr>
+          <a:xfrm>
+            <a:off x="4128940" y="1772239"/>
+            <a:ext cx="1772239" cy="1772239"/>
+          </a:xfrm>
+          <a:prstGeom prst="ellipse">
+            <a:avLst/>
+          </a:prstGeom>
+          <a:solidFill>
+            <a:srgbClr val="FFC000"/>
+          </a:solidFill>
+          <a:ln>
+            <a:noFill/>
+          </a:ln>
+        </p:spPr>
+        <p:style>
+          <a:lnRef idx="2">
+            <a:schemeClr val="accent1">
+              <a:shade val="50000"/>
+            </a:schemeClr>
+          </a:lnRef>
+          <a:fillRef idx="1">
+            <a:schemeClr val="accent1"/>
+          </a:fillRef>
+          <a:effectRef idx="0">
+            <a:schemeClr val="accent1"/>
+          </a:effectRef>
+          <a:fontRef idx="minor">
+            <a:schemeClr val="lt1"/>
+          </a:fontRef>
+        </p:style>
+        <p:txBody>
+          <a:bodyPr rtlCol="0" anchor="ctr"/>
+          <a:lstStyle/>
+          <a:p>
+            <a:pPr algn="ctr"/>
+            <a:endParaRPr lang="en-SG"/>
+          </a:p>
+        </p:txBody>
+      </p:sp>
+      <p:sp>
+        <p:nvSpPr>
+          <p:cNvPr id="4" name="Oval 3">
+            <a:extLst>
+              <a:ext uri="{FF2B5EF4-FFF2-40B4-BE49-F238E27FC236}">
+                <a16:creationId xmlns:a16="http://schemas.microsoft.com/office/drawing/2014/main" id="{70BF5835-B35F-45FE-93DF-FBA8037EED99}"/>
+              </a:ext>
+            </a:extLst>
+          </p:cNvPr>
+          <p:cNvSpPr/>
+          <p:nvPr/>
+        </p:nvSpPr>
+        <p:spPr>
+          <a:xfrm>
+            <a:off x="4477732" y="2375554"/>
+            <a:ext cx="282804" cy="282804"/>
+          </a:xfrm>
+          <a:prstGeom prst="ellipse">
+            <a:avLst/>
+          </a:prstGeom>
+          <a:ln>
+            <a:noFill/>
+          </a:ln>
+        </p:spPr>
+        <p:style>
+          <a:lnRef idx="2">
+            <a:schemeClr val="accent1">
+              <a:shade val="50000"/>
+            </a:schemeClr>
+          </a:lnRef>
+          <a:fillRef idx="1">
+            <a:schemeClr val="accent1"/>
+          </a:fillRef>
+          <a:effectRef idx="0">
+            <a:schemeClr val="accent1"/>
+          </a:effectRef>
+          <a:fontRef idx="minor">
+            <a:schemeClr val="lt1"/>
+          </a:fontRef>
+        </p:style>
+        <p:txBody>
+          <a:bodyPr rtlCol="0" anchor="ctr"/>
+          <a:lstStyle/>
+          <a:p>
+            <a:pPr algn="ctr"/>
+            <a:endParaRPr lang="en-SG"/>
+          </a:p>
+        </p:txBody>
+      </p:sp>
+      <p:sp>
+        <p:nvSpPr>
+          <p:cNvPr id="5" name="Oval 4">
+            <a:extLst>
+              <a:ext uri="{FF2B5EF4-FFF2-40B4-BE49-F238E27FC236}">
+                <a16:creationId xmlns:a16="http://schemas.microsoft.com/office/drawing/2014/main" id="{E3903DE8-4FE7-4AFE-AF20-1701DE70415B}"/>
+              </a:ext>
+            </a:extLst>
+          </p:cNvPr>
+          <p:cNvSpPr/>
+          <p:nvPr/>
+        </p:nvSpPr>
+        <p:spPr>
+          <a:xfrm>
+            <a:off x="5261728" y="2375554"/>
+            <a:ext cx="282804" cy="282804"/>
+          </a:xfrm>
+          <a:prstGeom prst="ellipse">
+            <a:avLst/>
+          </a:prstGeom>
+          <a:ln>
+            <a:noFill/>
+          </a:ln>
+        </p:spPr>
+        <p:style>
+          <a:lnRef idx="2">
+            <a:schemeClr val="accent1">
+              <a:shade val="50000"/>
+            </a:schemeClr>
+          </a:lnRef>
+          <a:fillRef idx="1">
+            <a:schemeClr val="accent1"/>
+          </a:fillRef>
+          <a:effectRef idx="0">
+            <a:schemeClr val="accent1"/>
+          </a:effectRef>
+          <a:fontRef idx="minor">
+            <a:schemeClr val="lt1"/>
+          </a:fontRef>
+        </p:style>
+        <p:txBody>
+          <a:bodyPr rtlCol="0" anchor="ctr"/>
+          <a:lstStyle/>
+          <a:p>
+            <a:pPr algn="ctr"/>
+            <a:endParaRPr lang="en-SG"/>
+          </a:p>
+        </p:txBody>
+      </p:sp>
     </p:spTree>
     <p:extLst>
       <p:ext uri="{BB962C8B-B14F-4D97-AF65-F5344CB8AC3E}">

</xml_diff>